<commit_message>
Changes in AdditionalFeatures presentation
</commit_message>
<xml_diff>
--- a/Spring_Beginners_3_SpringBootAndCore_AddFeatures.pptx
+++ b/Spring_Beginners_3_SpringBootAndCore_AddFeatures.pptx
@@ -209,7 +209,7 @@
           <a:p>
             <a:fld id="{AD4DB1D7-A2E6-5540-AAB6-9A95390687AC}" type="datetimeFigureOut">
               <a:rPr lang="en-IL" smtClean="0"/>
-              <a:t>24/05/2023</a:t>
+              <a:t>14/06/2023</a:t>
             </a:fld>
             <a:endParaRPr lang="en-IL"/>
           </a:p>
@@ -1342,7 +1342,7 @@
             <a:fld id="{B61BEF0D-F0BB-DE4B-95CE-6DB70DBA9567}" type="datetimeFigureOut">
               <a:rPr lang="en-US" dirty="0"/>
               <a:pPr/>
-              <a:t>5/24/23</a:t>
+              <a:t>6/14/23</a:t>
             </a:fld>
             <a:endParaRPr lang="en-US" dirty="0"/>
           </a:p>
@@ -1590,7 +1590,7 @@
             <a:fld id="{B61BEF0D-F0BB-DE4B-95CE-6DB70DBA9567}" type="datetimeFigureOut">
               <a:rPr lang="en-US" dirty="0"/>
               <a:pPr/>
-              <a:t>5/24/23</a:t>
+              <a:t>6/14/23</a:t>
             </a:fld>
             <a:endParaRPr lang="en-US" dirty="0"/>
           </a:p>
@@ -1901,7 +1901,7 @@
             <a:fld id="{B61BEF0D-F0BB-DE4B-95CE-6DB70DBA9567}" type="datetimeFigureOut">
               <a:rPr lang="en-US" dirty="0"/>
               <a:pPr/>
-              <a:t>5/24/23</a:t>
+              <a:t>6/14/23</a:t>
             </a:fld>
             <a:endParaRPr lang="en-US" dirty="0"/>
           </a:p>
@@ -2239,7 +2239,7 @@
             <a:fld id="{B61BEF0D-F0BB-DE4B-95CE-6DB70DBA9567}" type="datetimeFigureOut">
               <a:rPr lang="en-US" dirty="0"/>
               <a:pPr/>
-              <a:t>5/24/23</a:t>
+              <a:t>6/14/23</a:t>
             </a:fld>
             <a:endParaRPr lang="en-US" dirty="0"/>
           </a:p>
@@ -2550,7 +2550,7 @@
             <a:fld id="{B61BEF0D-F0BB-DE4B-95CE-6DB70DBA9567}" type="datetimeFigureOut">
               <a:rPr lang="en-US" dirty="0"/>
               <a:pPr/>
-              <a:t>5/24/23</a:t>
+              <a:t>6/14/23</a:t>
             </a:fld>
             <a:endParaRPr lang="en-US" dirty="0"/>
           </a:p>
@@ -2940,7 +2940,7 @@
             <a:fld id="{B61BEF0D-F0BB-DE4B-95CE-6DB70DBA9567}" type="datetimeFigureOut">
               <a:rPr lang="en-US" dirty="0"/>
               <a:pPr/>
-              <a:t>5/24/23</a:t>
+              <a:t>6/14/23</a:t>
             </a:fld>
             <a:endParaRPr lang="en-US" dirty="0"/>
           </a:p>
@@ -3106,7 +3106,7 @@
           <a:p>
             <a:fld id="{55C6B4A9-1611-4792-9094-5F34BCA07E0B}" type="datetimeFigureOut">
               <a:rPr lang="en-US" dirty="0"/>
-              <a:t>5/24/23</a:t>
+              <a:t>6/14/23</a:t>
             </a:fld>
             <a:endParaRPr lang="en-US" dirty="0"/>
           </a:p>
@@ -3282,7 +3282,7 @@
             <a:fld id="{B61BEF0D-F0BB-DE4B-95CE-6DB70DBA9567}" type="datetimeFigureOut">
               <a:rPr lang="en-US" dirty="0"/>
               <a:pPr/>
-              <a:t>5/24/23</a:t>
+              <a:t>6/14/23</a:t>
             </a:fld>
             <a:endParaRPr lang="en-US" dirty="0"/>
           </a:p>
@@ -3455,7 +3455,7 @@
             <a:fld id="{B61BEF0D-F0BB-DE4B-95CE-6DB70DBA9567}" type="datetimeFigureOut">
               <a:rPr lang="en-US" dirty="0"/>
               <a:pPr/>
-              <a:t>5/24/23</a:t>
+              <a:t>6/14/23</a:t>
             </a:fld>
             <a:endParaRPr lang="en-US" dirty="0"/>
           </a:p>
@@ -3699,7 +3699,7 @@
             <a:fld id="{B61BEF0D-F0BB-DE4B-95CE-6DB70DBA9567}" type="datetimeFigureOut">
               <a:rPr lang="en-US" dirty="0"/>
               <a:pPr/>
-              <a:t>5/24/23</a:t>
+              <a:t>6/14/23</a:t>
             </a:fld>
             <a:endParaRPr lang="en-US" dirty="0"/>
           </a:p>
@@ -3927,7 +3927,7 @@
           <a:p>
             <a:fld id="{EB712588-04B1-427B-82EE-E8DB90309F08}" type="datetimeFigureOut">
               <a:rPr lang="en-US" dirty="0"/>
-              <a:t>5/24/23</a:t>
+              <a:t>6/14/23</a:t>
             </a:fld>
             <a:endParaRPr lang="en-US" dirty="0"/>
           </a:p>
@@ -4297,7 +4297,7 @@
             <a:fld id="{B61BEF0D-F0BB-DE4B-95CE-6DB70DBA9567}" type="datetimeFigureOut">
               <a:rPr lang="en-US" dirty="0"/>
               <a:pPr/>
-              <a:t>5/24/23</a:t>
+              <a:t>6/14/23</a:t>
             </a:fld>
             <a:endParaRPr lang="en-US" dirty="0"/>
           </a:p>
@@ -4417,7 +4417,7 @@
             <a:fld id="{B61BEF0D-F0BB-DE4B-95CE-6DB70DBA9567}" type="datetimeFigureOut">
               <a:rPr lang="en-US" dirty="0"/>
               <a:pPr/>
-              <a:t>5/24/23</a:t>
+              <a:t>6/14/23</a:t>
             </a:fld>
             <a:endParaRPr lang="en-US" dirty="0"/>
           </a:p>
@@ -4509,7 +4509,7 @@
             <a:fld id="{B61BEF0D-F0BB-DE4B-95CE-6DB70DBA9567}" type="datetimeFigureOut">
               <a:rPr lang="en-US" dirty="0"/>
               <a:pPr/>
-              <a:t>5/24/23</a:t>
+              <a:t>6/14/23</a:t>
             </a:fld>
             <a:endParaRPr lang="en-US" dirty="0"/>
           </a:p>
@@ -4760,7 +4760,7 @@
           <a:p>
             <a:fld id="{42A54C80-263E-416B-A8E0-580EDEADCBDC}" type="datetimeFigureOut">
               <a:rPr lang="en-US" dirty="0"/>
-              <a:t>5/24/23</a:t>
+              <a:t>6/14/23</a:t>
             </a:fld>
             <a:endParaRPr lang="en-US" dirty="0"/>
           </a:p>
@@ -5019,7 +5019,7 @@
             <a:fld id="{B61BEF0D-F0BB-DE4B-95CE-6DB70DBA9567}" type="datetimeFigureOut">
               <a:rPr lang="en-US" dirty="0"/>
               <a:pPr/>
-              <a:t>5/24/23</a:t>
+              <a:t>6/14/23</a:t>
             </a:fld>
             <a:endParaRPr lang="en-US" dirty="0"/>
           </a:p>
@@ -5759,7 +5759,7 @@
             <a:fld id="{B61BEF0D-F0BB-DE4B-95CE-6DB70DBA9567}" type="datetimeFigureOut">
               <a:rPr lang="en-US" dirty="0"/>
               <a:pPr/>
-              <a:t>5/24/23</a:t>
+              <a:t>6/14/23</a:t>
             </a:fld>
             <a:endParaRPr lang="en-US" dirty="0"/>
           </a:p>
@@ -7449,6 +7449,199 @@
   <p:clrMapOvr>
     <a:masterClrMapping/>
   </p:clrMapOvr>
+  <p:timing>
+    <p:tnLst>
+      <p:par>
+        <p:cTn id="1" dur="indefinite" restart="never" nodeType="tmRoot">
+          <p:childTnLst>
+            <p:seq concurrent="1" nextAc="seek">
+              <p:cTn id="2" dur="indefinite" nodeType="mainSeq">
+                <p:childTnLst>
+                  <p:par>
+                    <p:cTn id="3" fill="hold">
+                      <p:stCondLst>
+                        <p:cond delay="indefinite"/>
+                      </p:stCondLst>
+                      <p:childTnLst>
+                        <p:par>
+                          <p:cTn id="4" fill="hold">
+                            <p:stCondLst>
+                              <p:cond delay="0"/>
+                            </p:stCondLst>
+                            <p:childTnLst>
+                              <p:par>
+                                <p:cTn id="5" presetID="1" presetClass="entr" presetSubtype="0" fill="hold" grpId="0" nodeType="clickEffect">
+                                  <p:stCondLst>
+                                    <p:cond delay="0"/>
+                                  </p:stCondLst>
+                                  <p:childTnLst>
+                                    <p:set>
+                                      <p:cBhvr>
+                                        <p:cTn id="6" dur="1" fill="hold">
+                                          <p:stCondLst>
+                                            <p:cond delay="0"/>
+                                          </p:stCondLst>
+                                        </p:cTn>
+                                        <p:tgtEl>
+                                          <p:spTgt spid="3">
+                                            <p:txEl>
+                                              <p:pRg st="0" end="0"/>
+                                            </p:txEl>
+                                          </p:spTgt>
+                                        </p:tgtEl>
+                                        <p:attrNameLst>
+                                          <p:attrName>style.visibility</p:attrName>
+                                        </p:attrNameLst>
+                                      </p:cBhvr>
+                                      <p:to>
+                                        <p:strVal val="visible"/>
+                                      </p:to>
+                                    </p:set>
+                                  </p:childTnLst>
+                                </p:cTn>
+                              </p:par>
+                            </p:childTnLst>
+                          </p:cTn>
+                        </p:par>
+                      </p:childTnLst>
+                    </p:cTn>
+                  </p:par>
+                  <p:par>
+                    <p:cTn id="7" fill="hold">
+                      <p:stCondLst>
+                        <p:cond delay="indefinite"/>
+                      </p:stCondLst>
+                      <p:childTnLst>
+                        <p:par>
+                          <p:cTn id="8" fill="hold">
+                            <p:stCondLst>
+                              <p:cond delay="0"/>
+                            </p:stCondLst>
+                            <p:childTnLst>
+                              <p:par>
+                                <p:cTn id="9" presetID="1" presetClass="entr" presetSubtype="0" fill="hold" grpId="0" nodeType="clickEffect">
+                                  <p:stCondLst>
+                                    <p:cond delay="0"/>
+                                  </p:stCondLst>
+                                  <p:childTnLst>
+                                    <p:set>
+                                      <p:cBhvr>
+                                        <p:cTn id="10" dur="1" fill="hold">
+                                          <p:stCondLst>
+                                            <p:cond delay="0"/>
+                                          </p:stCondLst>
+                                        </p:cTn>
+                                        <p:tgtEl>
+                                          <p:spTgt spid="3">
+                                            <p:txEl>
+                                              <p:pRg st="1" end="1"/>
+                                            </p:txEl>
+                                          </p:spTgt>
+                                        </p:tgtEl>
+                                        <p:attrNameLst>
+                                          <p:attrName>style.visibility</p:attrName>
+                                        </p:attrNameLst>
+                                      </p:cBhvr>
+                                      <p:to>
+                                        <p:strVal val="visible"/>
+                                      </p:to>
+                                    </p:set>
+                                  </p:childTnLst>
+                                </p:cTn>
+                              </p:par>
+                              <p:par>
+                                <p:cTn id="11" presetID="1" presetClass="entr" presetSubtype="0" fill="hold" grpId="0" nodeType="withEffect">
+                                  <p:stCondLst>
+                                    <p:cond delay="0"/>
+                                  </p:stCondLst>
+                                  <p:childTnLst>
+                                    <p:set>
+                                      <p:cBhvr>
+                                        <p:cTn id="12" dur="1" fill="hold">
+                                          <p:stCondLst>
+                                            <p:cond delay="0"/>
+                                          </p:stCondLst>
+                                        </p:cTn>
+                                        <p:tgtEl>
+                                          <p:spTgt spid="3">
+                                            <p:txEl>
+                                              <p:pRg st="2" end="2"/>
+                                            </p:txEl>
+                                          </p:spTgt>
+                                        </p:tgtEl>
+                                        <p:attrNameLst>
+                                          <p:attrName>style.visibility</p:attrName>
+                                        </p:attrNameLst>
+                                      </p:cBhvr>
+                                      <p:to>
+                                        <p:strVal val="visible"/>
+                                      </p:to>
+                                    </p:set>
+                                  </p:childTnLst>
+                                </p:cTn>
+                              </p:par>
+                              <p:par>
+                                <p:cTn id="13" presetID="1" presetClass="entr" presetSubtype="0" fill="hold" grpId="0" nodeType="withEffect">
+                                  <p:stCondLst>
+                                    <p:cond delay="0"/>
+                                  </p:stCondLst>
+                                  <p:childTnLst>
+                                    <p:set>
+                                      <p:cBhvr>
+                                        <p:cTn id="14" dur="1" fill="hold">
+                                          <p:stCondLst>
+                                            <p:cond delay="0"/>
+                                          </p:stCondLst>
+                                        </p:cTn>
+                                        <p:tgtEl>
+                                          <p:spTgt spid="3">
+                                            <p:txEl>
+                                              <p:pRg st="3" end="3"/>
+                                            </p:txEl>
+                                          </p:spTgt>
+                                        </p:tgtEl>
+                                        <p:attrNameLst>
+                                          <p:attrName>style.visibility</p:attrName>
+                                        </p:attrNameLst>
+                                      </p:cBhvr>
+                                      <p:to>
+                                        <p:strVal val="visible"/>
+                                      </p:to>
+                                    </p:set>
+                                  </p:childTnLst>
+                                </p:cTn>
+                              </p:par>
+                            </p:childTnLst>
+                          </p:cTn>
+                        </p:par>
+                      </p:childTnLst>
+                    </p:cTn>
+                  </p:par>
+                </p:childTnLst>
+              </p:cTn>
+              <p:prevCondLst>
+                <p:cond evt="onPrev" delay="0">
+                  <p:tgtEl>
+                    <p:sldTgt/>
+                  </p:tgtEl>
+                </p:cond>
+              </p:prevCondLst>
+              <p:nextCondLst>
+                <p:cond evt="onNext" delay="0">
+                  <p:tgtEl>
+                    <p:sldTgt/>
+                  </p:tgtEl>
+                </p:cond>
+              </p:nextCondLst>
+            </p:seq>
+          </p:childTnLst>
+        </p:cTn>
+      </p:par>
+    </p:tnLst>
+    <p:bldLst>
+      <p:bldP spid="3" grpId="0" build="p"/>
+    </p:bldLst>
+  </p:timing>
 </p:sld>
 </file>
 

</xml_diff>